<commit_message>
New data set + Lecture Notes Added
</commit_message>
<xml_diff>
--- a/Lecture Notes-Slides/Lecture 9.pptx
+++ b/Lecture Notes-Slides/Lecture 9.pptx
@@ -207,7 +207,7 @@
           <a:p>
             <a:fld id="{E13616D7-7E1D-7149-B1BA-1C4D5B5326AC}" type="datetimeFigureOut">
               <a:rPr lang="en-US" smtClean="0"/>
-              <a:t>2/26/16</a:t>
+              <a:t>2/27/16</a:t>
             </a:fld>
             <a:endParaRPr lang="en-US"/>
           </a:p>
@@ -753,7 +753,7 @@
           <a:p>
             <a:fld id="{04CF736D-88B8-2442-8CCB-69E82654D636}" type="datetimeFigureOut">
               <a:rPr lang="en-US" smtClean="0"/>
-              <a:t>2/26/16</a:t>
+              <a:t>2/27/16</a:t>
             </a:fld>
             <a:endParaRPr lang="en-US"/>
           </a:p>
@@ -918,7 +918,7 @@
           <a:p>
             <a:fld id="{04CF736D-88B8-2442-8CCB-69E82654D636}" type="datetimeFigureOut">
               <a:rPr lang="en-US" smtClean="0"/>
-              <a:t>2/26/16</a:t>
+              <a:t>2/27/16</a:t>
             </a:fld>
             <a:endParaRPr lang="en-US"/>
           </a:p>
@@ -1093,7 +1093,7 @@
           <a:p>
             <a:fld id="{04CF736D-88B8-2442-8CCB-69E82654D636}" type="datetimeFigureOut">
               <a:rPr lang="en-US" smtClean="0"/>
-              <a:t>2/26/16</a:t>
+              <a:t>2/27/16</a:t>
             </a:fld>
             <a:endParaRPr lang="en-US"/>
           </a:p>
@@ -1258,7 +1258,7 @@
           <a:p>
             <a:fld id="{04CF736D-88B8-2442-8CCB-69E82654D636}" type="datetimeFigureOut">
               <a:rPr lang="en-US" smtClean="0"/>
-              <a:t>2/26/16</a:t>
+              <a:t>2/27/16</a:t>
             </a:fld>
             <a:endParaRPr lang="en-US"/>
           </a:p>
@@ -1499,7 +1499,7 @@
           <a:p>
             <a:fld id="{04CF736D-88B8-2442-8CCB-69E82654D636}" type="datetimeFigureOut">
               <a:rPr lang="en-US" smtClean="0"/>
-              <a:t>2/26/16</a:t>
+              <a:t>2/27/16</a:t>
             </a:fld>
             <a:endParaRPr lang="en-US"/>
           </a:p>
@@ -1782,7 +1782,7 @@
           <a:p>
             <a:fld id="{04CF736D-88B8-2442-8CCB-69E82654D636}" type="datetimeFigureOut">
               <a:rPr lang="en-US" smtClean="0"/>
-              <a:t>2/26/16</a:t>
+              <a:t>2/27/16</a:t>
             </a:fld>
             <a:endParaRPr lang="en-US"/>
           </a:p>
@@ -2211,7 +2211,7 @@
           <a:p>
             <a:fld id="{04CF736D-88B8-2442-8CCB-69E82654D636}" type="datetimeFigureOut">
               <a:rPr lang="en-US" smtClean="0"/>
-              <a:t>2/26/16</a:t>
+              <a:t>2/27/16</a:t>
             </a:fld>
             <a:endParaRPr lang="en-US"/>
           </a:p>
@@ -2324,7 +2324,7 @@
           <a:p>
             <a:fld id="{04CF736D-88B8-2442-8CCB-69E82654D636}" type="datetimeFigureOut">
               <a:rPr lang="en-US" smtClean="0"/>
-              <a:t>2/26/16</a:t>
+              <a:t>2/27/16</a:t>
             </a:fld>
             <a:endParaRPr lang="en-US"/>
           </a:p>
@@ -2414,7 +2414,7 @@
           <a:p>
             <a:fld id="{04CF736D-88B8-2442-8CCB-69E82654D636}" type="datetimeFigureOut">
               <a:rPr lang="en-US" smtClean="0"/>
-              <a:t>2/26/16</a:t>
+              <a:t>2/27/16</a:t>
             </a:fld>
             <a:endParaRPr lang="en-US"/>
           </a:p>
@@ -2603,7 +2603,7 @@
           <a:p>
             <a:fld id="{04CF736D-88B8-2442-8CCB-69E82654D636}" type="datetimeFigureOut">
               <a:rPr lang="en-US" smtClean="0"/>
-              <a:t>2/26/16</a:t>
+              <a:t>2/27/16</a:t>
             </a:fld>
             <a:endParaRPr lang="en-US"/>
           </a:p>
@@ -2921,7 +2921,7 @@
           <a:p>
             <a:fld id="{04CF736D-88B8-2442-8CCB-69E82654D636}" type="datetimeFigureOut">
               <a:rPr lang="en-US" smtClean="0"/>
-              <a:t>2/26/16</a:t>
+              <a:t>2/27/16</a:t>
             </a:fld>
             <a:endParaRPr lang="en-US"/>
           </a:p>
@@ -3300,7 +3300,7 @@
           <a:p>
             <a:fld id="{04CF736D-88B8-2442-8CCB-69E82654D636}" type="datetimeFigureOut">
               <a:rPr lang="en-US" smtClean="0"/>
-              <a:t>2/26/16</a:t>
+              <a:t>2/27/16</a:t>
             </a:fld>
             <a:endParaRPr lang="en-US"/>
           </a:p>

</xml_diff>